<commit_message>
finalsing the GITassignment.pptx by adding screenshots
</commit_message>
<xml_diff>
--- a/GITassignment.pptx
+++ b/GITassignment.pptx
@@ -5,7 +5,7 @@
     <p:sldMasterId id="2147483676" r:id="rId1"/>
   </p:sldMasterIdLst>
   <p:notesMasterIdLst>
-    <p:notesMasterId r:id="rId13"/>
+    <p:notesMasterId r:id="rId15"/>
   </p:notesMasterIdLst>
   <p:sldIdLst>
     <p:sldId id="279" r:id="rId2"/>
@@ -16,9 +16,11 @@
     <p:sldId id="307" r:id="rId7"/>
     <p:sldId id="308" r:id="rId8"/>
     <p:sldId id="304" r:id="rId9"/>
-    <p:sldId id="303" r:id="rId10"/>
-    <p:sldId id="305" r:id="rId11"/>
-    <p:sldId id="300" r:id="rId12"/>
+    <p:sldId id="309" r:id="rId10"/>
+    <p:sldId id="303" r:id="rId11"/>
+    <p:sldId id="310" r:id="rId12"/>
+    <p:sldId id="305" r:id="rId13"/>
+    <p:sldId id="300" r:id="rId14"/>
   </p:sldIdLst>
   <p:sldSz cx="12192000" cy="6858000"/>
   <p:notesSz cx="6858000" cy="9144000"/>
@@ -903,6 +905,224 @@
     </p:spTree>
     <p:extLst>
       <p:ext uri="{BB962C8B-B14F-4D97-AF65-F5344CB8AC3E}">
+        <p14:creationId xmlns:p14="http://schemas.microsoft.com/office/powerpoint/2010/main" val="3367488201"/>
+      </p:ext>
+    </p:extLst>
+  </p:cSld>
+  <p:clrMapOvr>
+    <a:masterClrMapping/>
+  </p:clrMapOvr>
+</p:notes>
+</file>
+
+<file path=ppt/notesSlides/notesSlide11.xml><?xml version="1.0" encoding="utf-8"?>
+<p:notes xmlns:a="http://schemas.openxmlformats.org/drawingml/2006/main" xmlns:r="http://schemas.openxmlformats.org/officeDocument/2006/relationships" xmlns:p="http://schemas.openxmlformats.org/presentationml/2006/main" showMasterSp="0" showMasterPhAnim="0">
+  <p:cSld>
+    <p:spTree>
+      <p:nvGrpSpPr>
+        <p:cNvPr id="1" name="Shape 266"/>
+        <p:cNvGrpSpPr/>
+        <p:nvPr/>
+      </p:nvGrpSpPr>
+      <p:grpSpPr>
+        <a:xfrm>
+          <a:off x="0" y="0"/>
+          <a:ext cx="0" cy="0"/>
+          <a:chOff x="0" y="0"/>
+          <a:chExt cx="0" cy="0"/>
+        </a:xfrm>
+      </p:grpSpPr>
+      <p:sp>
+        <p:nvSpPr>
+          <p:cNvPr id="267" name="Google Shape;267;p7:notes"/>
+          <p:cNvSpPr txBox="1">
+            <a:spLocks noGrp="1"/>
+          </p:cNvSpPr>
+          <p:nvPr>
+            <p:ph type="body" idx="1"/>
+          </p:nvPr>
+        </p:nvSpPr>
+        <p:spPr>
+          <a:xfrm>
+            <a:off x="685800" y="4400550"/>
+            <a:ext cx="5486400" cy="3600450"/>
+          </a:xfrm>
+          <a:prstGeom prst="rect">
+            <a:avLst/>
+          </a:prstGeom>
+        </p:spPr>
+        <p:txBody>
+          <a:bodyPr spcFirstLastPara="1" wrap="square" lIns="91425" tIns="45700" rIns="91425" bIns="45700" anchor="t" anchorCtr="0">
+            <a:noAutofit/>
+          </a:bodyPr>
+          <a:lstStyle/>
+          <a:p>
+            <a:pPr marL="0" lvl="0" indent="0" algn="l" rtl="0">
+              <a:spcBef>
+                <a:spcPts val="0"/>
+              </a:spcBef>
+              <a:spcAft>
+                <a:spcPts val="0"/>
+              </a:spcAft>
+              <a:buNone/>
+            </a:pPr>
+            <a:endParaRPr/>
+          </a:p>
+        </p:txBody>
+      </p:sp>
+      <p:sp>
+        <p:nvSpPr>
+          <p:cNvPr id="268" name="Google Shape;268;p7:notes"/>
+          <p:cNvSpPr>
+            <a:spLocks noGrp="1" noRot="1" noChangeAspect="1"/>
+          </p:cNvSpPr>
+          <p:nvPr>
+            <p:ph type="sldImg" idx="2"/>
+          </p:nvPr>
+        </p:nvSpPr>
+        <p:spPr>
+          <a:xfrm>
+            <a:off x="685800" y="1143000"/>
+            <a:ext cx="5486400" cy="3086100"/>
+          </a:xfrm>
+          <a:custGeom>
+            <a:avLst/>
+            <a:gdLst/>
+            <a:ahLst/>
+            <a:cxnLst/>
+            <a:rect l="l" t="t" r="r" b="b"/>
+            <a:pathLst>
+              <a:path w="120000" h="120000" extrusionOk="0">
+                <a:moveTo>
+                  <a:pt x="0" y="0"/>
+                </a:moveTo>
+                <a:lnTo>
+                  <a:pt x="120000" y="0"/>
+                </a:lnTo>
+                <a:lnTo>
+                  <a:pt x="120000" y="120000"/>
+                </a:lnTo>
+                <a:lnTo>
+                  <a:pt x="0" y="120000"/>
+                </a:lnTo>
+                <a:close/>
+              </a:path>
+            </a:pathLst>
+          </a:custGeom>
+        </p:spPr>
+      </p:sp>
+    </p:spTree>
+    <p:extLst>
+      <p:ext uri="{BB962C8B-B14F-4D97-AF65-F5344CB8AC3E}">
+        <p14:creationId xmlns:p14="http://schemas.microsoft.com/office/powerpoint/2010/main" val="2035734445"/>
+      </p:ext>
+    </p:extLst>
+  </p:cSld>
+  <p:clrMapOvr>
+    <a:masterClrMapping/>
+  </p:clrMapOvr>
+</p:notes>
+</file>
+
+<file path=ppt/notesSlides/notesSlide12.xml><?xml version="1.0" encoding="utf-8"?>
+<p:notes xmlns:a="http://schemas.openxmlformats.org/drawingml/2006/main" xmlns:r="http://schemas.openxmlformats.org/officeDocument/2006/relationships" xmlns:p="http://schemas.openxmlformats.org/presentationml/2006/main" showMasterSp="0" showMasterPhAnim="0">
+  <p:cSld>
+    <p:spTree>
+      <p:nvGrpSpPr>
+        <p:cNvPr id="1" name="Shape 266"/>
+        <p:cNvGrpSpPr/>
+        <p:nvPr/>
+      </p:nvGrpSpPr>
+      <p:grpSpPr>
+        <a:xfrm>
+          <a:off x="0" y="0"/>
+          <a:ext cx="0" cy="0"/>
+          <a:chOff x="0" y="0"/>
+          <a:chExt cx="0" cy="0"/>
+        </a:xfrm>
+      </p:grpSpPr>
+      <p:sp>
+        <p:nvSpPr>
+          <p:cNvPr id="267" name="Google Shape;267;p7:notes"/>
+          <p:cNvSpPr txBox="1">
+            <a:spLocks noGrp="1"/>
+          </p:cNvSpPr>
+          <p:nvPr>
+            <p:ph type="body" idx="1"/>
+          </p:nvPr>
+        </p:nvSpPr>
+        <p:spPr>
+          <a:xfrm>
+            <a:off x="685800" y="4400550"/>
+            <a:ext cx="5486400" cy="3600450"/>
+          </a:xfrm>
+          <a:prstGeom prst="rect">
+            <a:avLst/>
+          </a:prstGeom>
+        </p:spPr>
+        <p:txBody>
+          <a:bodyPr spcFirstLastPara="1" wrap="square" lIns="91425" tIns="45700" rIns="91425" bIns="45700" anchor="t" anchorCtr="0">
+            <a:noAutofit/>
+          </a:bodyPr>
+          <a:lstStyle/>
+          <a:p>
+            <a:pPr marL="0" lvl="0" indent="0" algn="l" rtl="0">
+              <a:spcBef>
+                <a:spcPts val="0"/>
+              </a:spcBef>
+              <a:spcAft>
+                <a:spcPts val="0"/>
+              </a:spcAft>
+              <a:buNone/>
+            </a:pPr>
+            <a:endParaRPr/>
+          </a:p>
+        </p:txBody>
+      </p:sp>
+      <p:sp>
+        <p:nvSpPr>
+          <p:cNvPr id="268" name="Google Shape;268;p7:notes"/>
+          <p:cNvSpPr>
+            <a:spLocks noGrp="1" noRot="1" noChangeAspect="1"/>
+          </p:cNvSpPr>
+          <p:nvPr>
+            <p:ph type="sldImg" idx="2"/>
+          </p:nvPr>
+        </p:nvSpPr>
+        <p:spPr>
+          <a:xfrm>
+            <a:off x="685800" y="1143000"/>
+            <a:ext cx="5486400" cy="3086100"/>
+          </a:xfrm>
+          <a:custGeom>
+            <a:avLst/>
+            <a:gdLst/>
+            <a:ahLst/>
+            <a:cxnLst/>
+            <a:rect l="l" t="t" r="r" b="b"/>
+            <a:pathLst>
+              <a:path w="120000" h="120000" extrusionOk="0">
+                <a:moveTo>
+                  <a:pt x="0" y="0"/>
+                </a:moveTo>
+                <a:lnTo>
+                  <a:pt x="120000" y="0"/>
+                </a:lnTo>
+                <a:lnTo>
+                  <a:pt x="120000" y="120000"/>
+                </a:lnTo>
+                <a:lnTo>
+                  <a:pt x="0" y="120000"/>
+                </a:lnTo>
+                <a:close/>
+              </a:path>
+            </a:pathLst>
+          </a:custGeom>
+        </p:spPr>
+      </p:sp>
+    </p:spTree>
+    <p:extLst>
+      <p:ext uri="{BB962C8B-B14F-4D97-AF65-F5344CB8AC3E}">
         <p14:creationId xmlns:p14="http://schemas.microsoft.com/office/powerpoint/2010/main" val="2253889973"/>
       </p:ext>
     </p:extLst>
@@ -913,7 +1133,7 @@
 </p:notes>
 </file>
 
-<file path=ppt/notesSlides/notesSlide11.xml><?xml version="1.0" encoding="utf-8"?>
+<file path=ppt/notesSlides/notesSlide13.xml><?xml version="1.0" encoding="utf-8"?>
 <p:notes xmlns:a="http://schemas.openxmlformats.org/drawingml/2006/main" xmlns:r="http://schemas.openxmlformats.org/officeDocument/2006/relationships" xmlns:p="http://schemas.openxmlformats.org/presentationml/2006/main" showMasterSp="0" showMasterPhAnim="0">
   <p:cSld>
     <p:spTree>
@@ -1879,7 +2099,7 @@
     </p:spTree>
     <p:extLst>
       <p:ext uri="{BB962C8B-B14F-4D97-AF65-F5344CB8AC3E}">
-        <p14:creationId xmlns:p14="http://schemas.microsoft.com/office/powerpoint/2010/main" val="3367488201"/>
+        <p14:creationId xmlns:p14="http://schemas.microsoft.com/office/powerpoint/2010/main" val="3202713174"/>
       </p:ext>
     </p:extLst>
   </p:cSld>
@@ -4062,7 +4282,7 @@
         <p:fade thruBlk="1"/>
       </p:transition>
     </mc:Choice>
-    <mc:Fallback xmlns="" xmlns:mv="urn:schemas-microsoft-com:mac:vml" xmlns:c="http://schemas.openxmlformats.org/drawingml/2006/chart" xmlns:dgm="http://schemas.openxmlformats.org/drawingml/2006/diagram" xmlns:o="urn:schemas-microsoft-com:office:office" xmlns:v="urn:schemas-microsoft-com:vml" xmlns:pvml="urn:schemas-microsoft-com:office:powerpoint" xmlns:com="http://schemas.openxmlformats.org/drawingml/2006/compatibility" xmlns:p15="http://schemas.microsoft.com/office/powerpoint/2012/main" xmlns:ahyp="http://schemas.microsoft.com/office/drawing/2018/hyperlinkcolor">
+    <mc:Fallback xmlns:ahyp="http://schemas.microsoft.com/office/drawing/2018/hyperlinkcolor" xmlns:p15="http://schemas.microsoft.com/office/powerpoint/2012/main" xmlns:com="http://schemas.openxmlformats.org/drawingml/2006/compatibility" xmlns:pvml="urn:schemas-microsoft-com:office:powerpoint" xmlns:v="urn:schemas-microsoft-com:vml" xmlns:o="urn:schemas-microsoft-com:office:office" xmlns:dgm="http://schemas.openxmlformats.org/drawingml/2006/diagram" xmlns:c="http://schemas.openxmlformats.org/drawingml/2006/chart" xmlns:mv="urn:schemas-microsoft-com:mac:vml" xmlns="">
       <p:transition>
         <p:fade/>
       </p:transition>
@@ -5271,6 +5491,1210 @@
         </p:nvSpPr>
         <p:spPr>
           <a:xfrm>
+            <a:off x="659131" y="2207820"/>
+            <a:ext cx="10359647" cy="2285241"/>
+          </a:xfrm>
+          <a:prstGeom prst="rect">
+            <a:avLst/>
+          </a:prstGeom>
+          <a:noFill/>
+          <a:ln>
+            <a:noFill/>
+          </a:ln>
+        </p:spPr>
+        <p:txBody>
+          <a:bodyPr spcFirstLastPara="1" wrap="square" lIns="91425" tIns="45700" rIns="91425" bIns="45700" anchor="t" anchorCtr="0">
+            <a:noAutofit/>
+          </a:bodyPr>
+          <a:lstStyle/>
+          <a:p>
+            <a:pPr marL="342900" indent="-342900" algn="just">
+              <a:lnSpc>
+                <a:spcPct val="150000"/>
+              </a:lnSpc>
+              <a:buClr>
+                <a:schemeClr val="accent1"/>
+              </a:buClr>
+              <a:buSzPts val="1800"/>
+              <a:buFont typeface="Noto Sans Symbols"/>
+              <a:buChar char="❑"/>
+            </a:pPr>
+            <a:r>
+              <a:rPr lang="en-US" b="0" i="0" dirty="0">
+                <a:solidFill>
+                  <a:schemeClr val="tx1"/>
+                </a:solidFill>
+                <a:effectLst/>
+                <a:latin typeface="+mn-lt"/>
+              </a:rPr>
+              <a:t>The git pull command is used to fetch and download content from a remote repository and immediately update the local repository to match that content. Merging remote upstream changes into your local repository is a common task in Git-based collaboration work flows. </a:t>
+            </a:r>
+            <a:r>
+              <a:rPr lang="en-US" sz="1400" dirty="0">
+                <a:solidFill>
+                  <a:schemeClr val="tx1"/>
+                </a:solidFill>
+                <a:latin typeface="+mn-lt"/>
+                <a:ea typeface="Poppins"/>
+                <a:cs typeface="Poppins"/>
+                <a:sym typeface="Poppins"/>
+              </a:rPr>
+              <a:t>The git pull command is combination of two command git fetch followed by git merge.</a:t>
+            </a:r>
+          </a:p>
+          <a:p>
+            <a:pPr marL="342900" marR="0" lvl="0" indent="-228600" algn="just" rtl="0">
+              <a:lnSpc>
+                <a:spcPct val="150000"/>
+              </a:lnSpc>
+              <a:spcBef>
+                <a:spcPts val="0"/>
+              </a:spcBef>
+              <a:spcAft>
+                <a:spcPts val="0"/>
+              </a:spcAft>
+              <a:buClr>
+                <a:schemeClr val="accent1"/>
+              </a:buClr>
+              <a:buSzPts val="1800"/>
+              <a:buFont typeface="Noto Sans Symbols"/>
+              <a:buNone/>
+            </a:pPr>
+            <a:endParaRPr sz="1200" dirty="0">
+              <a:solidFill>
+                <a:schemeClr val="dk1"/>
+              </a:solidFill>
+              <a:latin typeface="Poppins"/>
+              <a:ea typeface="Poppins"/>
+              <a:cs typeface="Poppins"/>
+              <a:sym typeface="Poppins"/>
+            </a:endParaRPr>
+          </a:p>
+          <a:p>
+            <a:pPr marL="342900" marR="0" lvl="0" indent="-342900" algn="just" rtl="0">
+              <a:lnSpc>
+                <a:spcPct val="150000"/>
+              </a:lnSpc>
+              <a:spcBef>
+                <a:spcPts val="0"/>
+              </a:spcBef>
+              <a:spcAft>
+                <a:spcPts val="0"/>
+              </a:spcAft>
+              <a:buClr>
+                <a:schemeClr val="accent1"/>
+              </a:buClr>
+              <a:buSzPts val="1800"/>
+              <a:buFont typeface="Noto Sans Symbols"/>
+              <a:buChar char="❑"/>
+            </a:pPr>
+            <a:r>
+              <a:rPr lang="en-US" dirty="0">
+                <a:solidFill>
+                  <a:schemeClr val="dk1"/>
+                </a:solidFill>
+                <a:latin typeface="+mn-lt"/>
+                <a:ea typeface="Poppins"/>
+                <a:cs typeface="Poppins"/>
+                <a:sym typeface="Poppins"/>
+              </a:rPr>
+              <a:t>The git pull command is : git pull</a:t>
+            </a:r>
+          </a:p>
+          <a:p>
+            <a:pPr marL="342900" marR="0" lvl="0" indent="-342900" algn="just" rtl="0">
+              <a:lnSpc>
+                <a:spcPct val="150000"/>
+              </a:lnSpc>
+              <a:spcBef>
+                <a:spcPts val="0"/>
+              </a:spcBef>
+              <a:spcAft>
+                <a:spcPts val="0"/>
+              </a:spcAft>
+              <a:buClr>
+                <a:schemeClr val="accent1"/>
+              </a:buClr>
+              <a:buSzPts val="1800"/>
+              <a:buFont typeface="Noto Sans Symbols"/>
+              <a:buChar char="❑"/>
+            </a:pPr>
+            <a:endParaRPr lang="en-US" dirty="0">
+              <a:solidFill>
+                <a:schemeClr val="dk1"/>
+              </a:solidFill>
+              <a:latin typeface="+mn-lt"/>
+              <a:ea typeface="Poppins"/>
+              <a:cs typeface="Poppins"/>
+              <a:sym typeface="Poppins"/>
+            </a:endParaRPr>
+          </a:p>
+          <a:p>
+            <a:pPr marL="342900" marR="0" lvl="0" indent="-342900" algn="just" rtl="0">
+              <a:lnSpc>
+                <a:spcPct val="150000"/>
+              </a:lnSpc>
+              <a:spcBef>
+                <a:spcPts val="0"/>
+              </a:spcBef>
+              <a:spcAft>
+                <a:spcPts val="0"/>
+              </a:spcAft>
+              <a:buClr>
+                <a:schemeClr val="accent1"/>
+              </a:buClr>
+              <a:buSzPts val="1800"/>
+              <a:buFont typeface="Noto Sans Symbols"/>
+              <a:buChar char="❑"/>
+            </a:pPr>
+            <a:r>
+              <a:rPr lang="en-US" i="0" dirty="0">
+                <a:solidFill>
+                  <a:srgbClr val="202124"/>
+                </a:solidFill>
+                <a:effectLst/>
+                <a:latin typeface="+mn-lt"/>
+              </a:rPr>
+              <a:t>Commit your changes </a:t>
+            </a:r>
+            <a:r>
+              <a:rPr lang="en-US" b="0" i="0" dirty="0">
+                <a:solidFill>
+                  <a:srgbClr val="202124"/>
+                </a:solidFill>
+                <a:effectLst/>
+                <a:latin typeface="+mn-lt"/>
+              </a:rPr>
+              <a:t>before pulling so that your commits are merged with the remote changes during the pull, and always clone the repository before making new changes. </a:t>
+            </a:r>
+            <a:endParaRPr lang="en-US" dirty="0">
+              <a:solidFill>
+                <a:schemeClr val="dk1"/>
+              </a:solidFill>
+              <a:latin typeface="+mn-lt"/>
+              <a:ea typeface="Poppins"/>
+              <a:cs typeface="Poppins"/>
+              <a:sym typeface="Poppins"/>
+            </a:endParaRPr>
+          </a:p>
+          <a:p>
+            <a:pPr marR="0" lvl="0" algn="just" rtl="0">
+              <a:lnSpc>
+                <a:spcPct val="150000"/>
+              </a:lnSpc>
+              <a:spcBef>
+                <a:spcPts val="0"/>
+              </a:spcBef>
+              <a:spcAft>
+                <a:spcPts val="0"/>
+              </a:spcAft>
+              <a:buClr>
+                <a:schemeClr val="accent1"/>
+              </a:buClr>
+              <a:buSzPts val="1800"/>
+            </a:pPr>
+            <a:endParaRPr lang="en-US" sz="1200" dirty="0">
+              <a:solidFill>
+                <a:schemeClr val="dk1"/>
+              </a:solidFill>
+              <a:latin typeface="Poppins"/>
+              <a:ea typeface="Poppins"/>
+              <a:cs typeface="Poppins"/>
+              <a:sym typeface="Poppins"/>
+            </a:endParaRPr>
+          </a:p>
+          <a:p>
+            <a:pPr marR="0" lvl="0" algn="just" rtl="0">
+              <a:lnSpc>
+                <a:spcPct val="150000"/>
+              </a:lnSpc>
+              <a:spcBef>
+                <a:spcPts val="0"/>
+              </a:spcBef>
+              <a:spcAft>
+                <a:spcPts val="0"/>
+              </a:spcAft>
+              <a:buClr>
+                <a:schemeClr val="accent1"/>
+              </a:buClr>
+              <a:buSzPts val="1800"/>
+            </a:pPr>
+            <a:endParaRPr sz="1200" b="1" dirty="0">
+              <a:solidFill>
+                <a:srgbClr val="818181"/>
+              </a:solidFill>
+              <a:latin typeface="Poppins"/>
+              <a:ea typeface="Poppins"/>
+              <a:cs typeface="Poppins"/>
+              <a:sym typeface="Poppins"/>
+            </a:endParaRPr>
+          </a:p>
+        </p:txBody>
+      </p:sp>
+      <p:pic>
+        <p:nvPicPr>
+          <p:cNvPr id="271" name="Google Shape;271;p25"/>
+          <p:cNvPicPr preferRelativeResize="0"/>
+          <p:nvPr/>
+        </p:nvPicPr>
+        <p:blipFill rotWithShape="1">
+          <a:blip r:embed="rId3">
+            <a:alphaModFix/>
+          </a:blip>
+          <a:srcRect/>
+          <a:stretch/>
+        </p:blipFill>
+        <p:spPr>
+          <a:xfrm rot="5400000">
+            <a:off x="6929261" y="1620333"/>
+            <a:ext cx="6007504" cy="4930827"/>
+          </a:xfrm>
+          <a:prstGeom prst="rect">
+            <a:avLst/>
+          </a:prstGeom>
+          <a:noFill/>
+          <a:ln>
+            <a:noFill/>
+          </a:ln>
+        </p:spPr>
+      </p:pic>
+      <p:sp>
+        <p:nvSpPr>
+          <p:cNvPr id="272" name="Google Shape;272;p25"/>
+          <p:cNvSpPr txBox="1"/>
+          <p:nvPr/>
+        </p:nvSpPr>
+        <p:spPr>
+          <a:xfrm>
+            <a:off x="628650" y="624794"/>
+            <a:ext cx="6315075" cy="914400"/>
+          </a:xfrm>
+          <a:prstGeom prst="rect">
+            <a:avLst/>
+          </a:prstGeom>
+          <a:noFill/>
+          <a:ln>
+            <a:noFill/>
+          </a:ln>
+        </p:spPr>
+        <p:txBody>
+          <a:bodyPr spcFirstLastPara="1" wrap="square" lIns="91425" tIns="45700" rIns="91425" bIns="45700" anchor="t" anchorCtr="0">
+            <a:noAutofit/>
+          </a:bodyPr>
+          <a:lstStyle/>
+          <a:p>
+            <a:pPr>
+              <a:lnSpc>
+                <a:spcPct val="90000"/>
+              </a:lnSpc>
+              <a:buClr>
+                <a:schemeClr val="dk1"/>
+              </a:buClr>
+              <a:buSzPts val="4400"/>
+            </a:pPr>
+            <a:r>
+              <a:rPr lang="en-US" sz="4400" u="sng" dirty="0">
+                <a:solidFill>
+                  <a:schemeClr val="dk1"/>
+                </a:solidFill>
+                <a:latin typeface="Lato Black"/>
+                <a:ea typeface="Lato Black"/>
+                <a:cs typeface="Lato Black"/>
+                <a:sym typeface="Lato Black"/>
+              </a:rPr>
+              <a:t>My Work</a:t>
+            </a:r>
+          </a:p>
+          <a:p>
+            <a:pPr marL="0" marR="0" lvl="0" indent="0" algn="l" rtl="0">
+              <a:lnSpc>
+                <a:spcPct val="90000"/>
+              </a:lnSpc>
+              <a:spcBef>
+                <a:spcPts val="0"/>
+              </a:spcBef>
+              <a:spcAft>
+                <a:spcPts val="0"/>
+              </a:spcAft>
+              <a:buClr>
+                <a:schemeClr val="dk1"/>
+              </a:buClr>
+              <a:buSzPts val="4400"/>
+              <a:buFont typeface="Lato Black"/>
+              <a:buNone/>
+            </a:pPr>
+            <a:endParaRPr sz="4400" u="sng" dirty="0">
+              <a:solidFill>
+                <a:schemeClr val="dk1"/>
+              </a:solidFill>
+              <a:latin typeface="Lato Black"/>
+              <a:ea typeface="Lato Black"/>
+              <a:cs typeface="Lato Black"/>
+              <a:sym typeface="Lato Black"/>
+            </a:endParaRPr>
+          </a:p>
+        </p:txBody>
+      </p:sp>
+      <p:sp>
+        <p:nvSpPr>
+          <p:cNvPr id="273" name="Google Shape;273;p25"/>
+          <p:cNvSpPr txBox="1"/>
+          <p:nvPr/>
+        </p:nvSpPr>
+        <p:spPr>
+          <a:xfrm>
+            <a:off x="628650" y="1334687"/>
+            <a:ext cx="5029200" cy="714375"/>
+          </a:xfrm>
+          <a:prstGeom prst="rect">
+            <a:avLst/>
+          </a:prstGeom>
+          <a:noFill/>
+          <a:ln>
+            <a:noFill/>
+          </a:ln>
+        </p:spPr>
+        <p:txBody>
+          <a:bodyPr spcFirstLastPara="1" wrap="square" lIns="91425" tIns="45700" rIns="91425" bIns="45700" anchor="t" anchorCtr="0">
+            <a:noAutofit/>
+          </a:bodyPr>
+          <a:lstStyle/>
+          <a:p>
+            <a:pPr marL="0" marR="0" lvl="0" indent="0" algn="l" rtl="0">
+              <a:lnSpc>
+                <a:spcPct val="130000"/>
+              </a:lnSpc>
+              <a:spcBef>
+                <a:spcPts val="0"/>
+              </a:spcBef>
+              <a:spcAft>
+                <a:spcPts val="0"/>
+              </a:spcAft>
+              <a:buClr>
+                <a:schemeClr val="dk2"/>
+              </a:buClr>
+              <a:buSzPts val="1540"/>
+              <a:buFont typeface="Arial"/>
+              <a:buNone/>
+            </a:pPr>
+            <a:endParaRPr lang="en-IN" dirty="0"/>
+          </a:p>
+          <a:p>
+            <a:pPr marL="0" marR="0" lvl="0" indent="0" algn="l" rtl="0">
+              <a:lnSpc>
+                <a:spcPct val="130000"/>
+              </a:lnSpc>
+              <a:spcBef>
+                <a:spcPts val="0"/>
+              </a:spcBef>
+              <a:spcAft>
+                <a:spcPts val="0"/>
+              </a:spcAft>
+              <a:buClr>
+                <a:schemeClr val="dk2"/>
+              </a:buClr>
+              <a:buSzPts val="1540"/>
+              <a:buFont typeface="Arial"/>
+              <a:buNone/>
+            </a:pPr>
+            <a:r>
+              <a:rPr lang="en-IN" b="1" dirty="0"/>
+              <a:t>What is git pull</a:t>
+            </a:r>
+            <a:endParaRPr b="1" dirty="0"/>
+          </a:p>
+        </p:txBody>
+      </p:sp>
+      <p:grpSp>
+        <p:nvGrpSpPr>
+          <p:cNvPr id="274" name="Google Shape;274;p25"/>
+          <p:cNvGrpSpPr/>
+          <p:nvPr/>
+        </p:nvGrpSpPr>
+        <p:grpSpPr>
+          <a:xfrm>
+            <a:off x="-8928" y="6325927"/>
+            <a:ext cx="12200929" cy="470414"/>
+            <a:chOff x="-8928" y="6325927"/>
+            <a:chExt cx="12200929" cy="470414"/>
+          </a:xfrm>
+        </p:grpSpPr>
+        <p:sp>
+          <p:nvSpPr>
+            <p:cNvPr id="275" name="Google Shape;275;p25"/>
+            <p:cNvSpPr/>
+            <p:nvPr/>
+          </p:nvSpPr>
+          <p:spPr>
+            <a:xfrm>
+              <a:off x="-8928" y="6576629"/>
+              <a:ext cx="10470284" cy="45719"/>
+            </a:xfrm>
+            <a:prstGeom prst="rect">
+              <a:avLst/>
+            </a:prstGeom>
+            <a:solidFill>
+              <a:srgbClr val="004586"/>
+            </a:solidFill>
+            <a:ln>
+              <a:noFill/>
+            </a:ln>
+          </p:spPr>
+          <p:txBody>
+            <a:bodyPr spcFirstLastPara="1" wrap="square" lIns="91425" tIns="45700" rIns="91425" bIns="45700" anchor="ctr" anchorCtr="0">
+              <a:noAutofit/>
+            </a:bodyPr>
+            <a:lstStyle/>
+            <a:p>
+              <a:pPr marL="0" marR="0" lvl="0" indent="0" algn="ctr" rtl="0">
+                <a:spcBef>
+                  <a:spcPts val="0"/>
+                </a:spcBef>
+                <a:spcAft>
+                  <a:spcPts val="0"/>
+                </a:spcAft>
+                <a:buNone/>
+              </a:pPr>
+              <a:endParaRPr sz="1800">
+                <a:solidFill>
+                  <a:schemeClr val="lt1"/>
+                </a:solidFill>
+                <a:latin typeface="Poppins Light"/>
+                <a:ea typeface="Poppins Light"/>
+                <a:cs typeface="Poppins Light"/>
+                <a:sym typeface="Poppins Light"/>
+              </a:endParaRPr>
+            </a:p>
+          </p:txBody>
+        </p:sp>
+        <p:pic>
+          <p:nvPicPr>
+            <p:cNvPr id="276" name="Google Shape;276;p25"/>
+            <p:cNvPicPr preferRelativeResize="0"/>
+            <p:nvPr/>
+          </p:nvPicPr>
+          <p:blipFill rotWithShape="1">
+            <a:blip r:embed="rId4">
+              <a:alphaModFix/>
+            </a:blip>
+            <a:srcRect/>
+            <a:stretch/>
+          </p:blipFill>
+          <p:spPr>
+            <a:xfrm>
+              <a:off x="10548364" y="6325927"/>
+              <a:ext cx="470414" cy="470414"/>
+            </a:xfrm>
+            <a:prstGeom prst="rect">
+              <a:avLst/>
+            </a:prstGeom>
+            <a:noFill/>
+            <a:ln>
+              <a:noFill/>
+            </a:ln>
+          </p:spPr>
+        </p:pic>
+        <p:sp>
+          <p:nvSpPr>
+            <p:cNvPr id="277" name="Google Shape;277;p25"/>
+            <p:cNvSpPr/>
+            <p:nvPr/>
+          </p:nvSpPr>
+          <p:spPr>
+            <a:xfrm rot="10800000" flipH="1">
+              <a:off x="11105786" y="6576628"/>
+              <a:ext cx="1086215" cy="45719"/>
+            </a:xfrm>
+            <a:prstGeom prst="rect">
+              <a:avLst/>
+            </a:prstGeom>
+            <a:solidFill>
+              <a:srgbClr val="004586"/>
+            </a:solidFill>
+            <a:ln>
+              <a:noFill/>
+            </a:ln>
+          </p:spPr>
+          <p:txBody>
+            <a:bodyPr spcFirstLastPara="1" wrap="square" lIns="91425" tIns="45700" rIns="91425" bIns="45700" anchor="ctr" anchorCtr="0">
+              <a:noAutofit/>
+            </a:bodyPr>
+            <a:lstStyle/>
+            <a:p>
+              <a:pPr marL="0" marR="0" lvl="0" indent="0" algn="ctr" rtl="0">
+                <a:spcBef>
+                  <a:spcPts val="0"/>
+                </a:spcBef>
+                <a:spcAft>
+                  <a:spcPts val="0"/>
+                </a:spcAft>
+                <a:buNone/>
+              </a:pPr>
+              <a:endParaRPr sz="1800">
+                <a:solidFill>
+                  <a:schemeClr val="lt1"/>
+                </a:solidFill>
+                <a:latin typeface="Poppins Light"/>
+                <a:ea typeface="Poppins Light"/>
+                <a:cs typeface="Poppins Light"/>
+                <a:sym typeface="Poppins Light"/>
+              </a:endParaRPr>
+            </a:p>
+          </p:txBody>
+        </p:sp>
+      </p:grpSp>
+    </p:spTree>
+    <p:extLst>
+      <p:ext uri="{BB962C8B-B14F-4D97-AF65-F5344CB8AC3E}">
+        <p14:creationId xmlns:p14="http://schemas.microsoft.com/office/powerpoint/2010/main" val="2899102661"/>
+      </p:ext>
+    </p:extLst>
+  </p:cSld>
+  <p:clrMapOvr>
+    <a:masterClrMapping/>
+  </p:clrMapOvr>
+  <p:transition spd="slow">
+    <p:push dir="r"/>
+  </p:transition>
+  <p:timing>
+    <p:tnLst>
+      <p:par>
+        <p:cTn id="1" dur="indefinite" restart="never" nodeType="tmRoot">
+          <p:childTnLst>
+            <p:seq concurrent="1" nextAc="seek">
+              <p:cTn id="2" dur="indefinite" nodeType="mainSeq">
+                <p:childTnLst>
+                  <p:par>
+                    <p:cTn id="3" fill="hold">
+                      <p:stCondLst>
+                        <p:cond delay="indefinite"/>
+                        <p:cond evt="onBegin" delay="0">
+                          <p:tn val="2"/>
+                        </p:cond>
+                      </p:stCondLst>
+                      <p:childTnLst>
+                        <p:par>
+                          <p:cTn id="4" fill="hold">
+                            <p:stCondLst>
+                              <p:cond delay="0"/>
+                            </p:stCondLst>
+                            <p:childTnLst>
+                              <p:par>
+                                <p:cTn id="5" presetID="10" presetClass="entr" presetSubtype="0" fill="hold" nodeType="withEffect">
+                                  <p:stCondLst>
+                                    <p:cond delay="0"/>
+                                  </p:stCondLst>
+                                  <p:childTnLst>
+                                    <p:set>
+                                      <p:cBhvr>
+                                        <p:cTn id="6" dur="1" fill="hold">
+                                          <p:stCondLst>
+                                            <p:cond delay="0"/>
+                                          </p:stCondLst>
+                                        </p:cTn>
+                                        <p:tgtEl>
+                                          <p:spTgt spid="271"/>
+                                        </p:tgtEl>
+                                        <p:attrNameLst>
+                                          <p:attrName>style.visibility</p:attrName>
+                                        </p:attrNameLst>
+                                      </p:cBhvr>
+                                      <p:to>
+                                        <p:strVal val="visible"/>
+                                      </p:to>
+                                    </p:set>
+                                    <p:animEffect transition="in" filter="fade">
+                                      <p:cBhvr>
+                                        <p:cTn id="7" dur="500"/>
+                                        <p:tgtEl>
+                                          <p:spTgt spid="271"/>
+                                        </p:tgtEl>
+                                      </p:cBhvr>
+                                    </p:animEffect>
+                                  </p:childTnLst>
+                                </p:cTn>
+                              </p:par>
+                            </p:childTnLst>
+                          </p:cTn>
+                        </p:par>
+                      </p:childTnLst>
+                    </p:cTn>
+                  </p:par>
+                </p:childTnLst>
+              </p:cTn>
+              <p:prevCondLst>
+                <p:cond evt="onPrev" delay="0">
+                  <p:tgtEl>
+                    <p:sldTgt/>
+                  </p:tgtEl>
+                </p:cond>
+              </p:prevCondLst>
+              <p:nextCondLst>
+                <p:cond evt="onNext" delay="0">
+                  <p:tgtEl>
+                    <p:sldTgt/>
+                  </p:tgtEl>
+                </p:cond>
+              </p:nextCondLst>
+            </p:seq>
+          </p:childTnLst>
+        </p:cTn>
+      </p:par>
+    </p:tnLst>
+  </p:timing>
+</p:sld>
+</file>
+
+<file path=ppt/slides/slide11.xml><?xml version="1.0" encoding="utf-8"?>
+<p:sld xmlns:a="http://schemas.openxmlformats.org/drawingml/2006/main" xmlns:r="http://schemas.openxmlformats.org/officeDocument/2006/relationships" xmlns:p="http://schemas.openxmlformats.org/presentationml/2006/main">
+  <p:cSld>
+    <p:spTree>
+      <p:nvGrpSpPr>
+        <p:cNvPr id="1" name="Shape 269"/>
+        <p:cNvGrpSpPr/>
+        <p:nvPr/>
+      </p:nvGrpSpPr>
+      <p:grpSpPr>
+        <a:xfrm>
+          <a:off x="0" y="0"/>
+          <a:ext cx="0" cy="0"/>
+          <a:chOff x="0" y="0"/>
+          <a:chExt cx="0" cy="0"/>
+        </a:xfrm>
+      </p:grpSpPr>
+      <p:sp>
+        <p:nvSpPr>
+          <p:cNvPr id="270" name="Google Shape;270;p25"/>
+          <p:cNvSpPr txBox="1"/>
+          <p:nvPr/>
+        </p:nvSpPr>
+        <p:spPr>
+          <a:xfrm>
+            <a:off x="523270" y="276099"/>
+            <a:ext cx="10359647" cy="2285241"/>
+          </a:xfrm>
+          <a:prstGeom prst="rect">
+            <a:avLst/>
+          </a:prstGeom>
+          <a:noFill/>
+          <a:ln>
+            <a:noFill/>
+          </a:ln>
+        </p:spPr>
+        <p:txBody>
+          <a:bodyPr spcFirstLastPara="1" wrap="square" lIns="91425" tIns="45700" rIns="91425" bIns="45700" anchor="t" anchorCtr="0">
+            <a:noAutofit/>
+          </a:bodyPr>
+          <a:lstStyle/>
+          <a:p>
+            <a:pPr marL="342900" marR="0" lvl="0" indent="-342900" algn="just" rtl="0">
+              <a:lnSpc>
+                <a:spcPct val="150000"/>
+              </a:lnSpc>
+              <a:spcBef>
+                <a:spcPts val="0"/>
+              </a:spcBef>
+              <a:spcAft>
+                <a:spcPts val="0"/>
+              </a:spcAft>
+              <a:buClr>
+                <a:schemeClr val="accent1"/>
+              </a:buClr>
+              <a:buSzPts val="1800"/>
+              <a:buFont typeface="Noto Sans Symbols"/>
+              <a:buChar char="❑"/>
+            </a:pPr>
+            <a:endParaRPr sz="1600" b="1" dirty="0">
+              <a:solidFill>
+                <a:srgbClr val="818181"/>
+              </a:solidFill>
+              <a:latin typeface="+mn-lt"/>
+              <a:ea typeface="Poppins"/>
+              <a:cs typeface="Poppins"/>
+              <a:sym typeface="Poppins"/>
+            </a:endParaRPr>
+          </a:p>
+        </p:txBody>
+      </p:sp>
+      <p:pic>
+        <p:nvPicPr>
+          <p:cNvPr id="271" name="Google Shape;271;p25"/>
+          <p:cNvPicPr preferRelativeResize="0"/>
+          <p:nvPr/>
+        </p:nvPicPr>
+        <p:blipFill rotWithShape="1">
+          <a:blip r:embed="rId3">
+            <a:alphaModFix/>
+          </a:blip>
+          <a:srcRect/>
+          <a:stretch/>
+        </p:blipFill>
+        <p:spPr>
+          <a:xfrm rot="5400000">
+            <a:off x="6929261" y="1620333"/>
+            <a:ext cx="6007504" cy="4930827"/>
+          </a:xfrm>
+          <a:prstGeom prst="rect">
+            <a:avLst/>
+          </a:prstGeom>
+          <a:noFill/>
+          <a:ln>
+            <a:noFill/>
+          </a:ln>
+        </p:spPr>
+      </p:pic>
+      <p:sp>
+        <p:nvSpPr>
+          <p:cNvPr id="272" name="Google Shape;272;p25"/>
+          <p:cNvSpPr txBox="1"/>
+          <p:nvPr/>
+        </p:nvSpPr>
+        <p:spPr>
+          <a:xfrm>
+            <a:off x="628650" y="358756"/>
+            <a:ext cx="6315075" cy="914400"/>
+          </a:xfrm>
+          <a:prstGeom prst="rect">
+            <a:avLst/>
+          </a:prstGeom>
+          <a:noFill/>
+          <a:ln>
+            <a:noFill/>
+          </a:ln>
+        </p:spPr>
+        <p:txBody>
+          <a:bodyPr spcFirstLastPara="1" wrap="square" lIns="91425" tIns="45700" rIns="91425" bIns="45700" anchor="t" anchorCtr="0">
+            <a:noAutofit/>
+          </a:bodyPr>
+          <a:lstStyle/>
+          <a:p>
+            <a:pPr>
+              <a:lnSpc>
+                <a:spcPct val="90000"/>
+              </a:lnSpc>
+              <a:buClr>
+                <a:schemeClr val="dk1"/>
+              </a:buClr>
+              <a:buSzPts val="4400"/>
+            </a:pPr>
+            <a:r>
+              <a:rPr lang="en-US" sz="4400" u="sng" dirty="0">
+                <a:solidFill>
+                  <a:schemeClr val="dk1"/>
+                </a:solidFill>
+                <a:latin typeface="+mj-lt"/>
+                <a:ea typeface="Lato Black"/>
+                <a:cs typeface="Lato Black"/>
+                <a:sym typeface="Lato Black"/>
+              </a:rPr>
+              <a:t>My Work</a:t>
+            </a:r>
+          </a:p>
+          <a:p>
+            <a:pPr marL="0" marR="0" lvl="0" indent="0" algn="l" rtl="0">
+              <a:lnSpc>
+                <a:spcPct val="90000"/>
+              </a:lnSpc>
+              <a:spcBef>
+                <a:spcPts val="0"/>
+              </a:spcBef>
+              <a:spcAft>
+                <a:spcPts val="0"/>
+              </a:spcAft>
+              <a:buClr>
+                <a:schemeClr val="dk1"/>
+              </a:buClr>
+              <a:buSzPts val="4400"/>
+              <a:buFont typeface="Lato Black"/>
+              <a:buNone/>
+            </a:pPr>
+            <a:endParaRPr sz="4400" u="sng" dirty="0">
+              <a:solidFill>
+                <a:schemeClr val="dk1"/>
+              </a:solidFill>
+              <a:latin typeface="Lato Black"/>
+              <a:ea typeface="Lato Black"/>
+              <a:cs typeface="Lato Black"/>
+              <a:sym typeface="Lato Black"/>
+            </a:endParaRPr>
+          </a:p>
+        </p:txBody>
+      </p:sp>
+      <p:sp>
+        <p:nvSpPr>
+          <p:cNvPr id="273" name="Google Shape;273;p25"/>
+          <p:cNvSpPr txBox="1"/>
+          <p:nvPr/>
+        </p:nvSpPr>
+        <p:spPr>
+          <a:xfrm>
+            <a:off x="673894" y="815956"/>
+            <a:ext cx="5029200" cy="714375"/>
+          </a:xfrm>
+          <a:prstGeom prst="rect">
+            <a:avLst/>
+          </a:prstGeom>
+          <a:noFill/>
+          <a:ln>
+            <a:noFill/>
+          </a:ln>
+        </p:spPr>
+        <p:txBody>
+          <a:bodyPr spcFirstLastPara="1" wrap="square" lIns="91425" tIns="45700" rIns="91425" bIns="45700" anchor="t" anchorCtr="0">
+            <a:noAutofit/>
+          </a:bodyPr>
+          <a:lstStyle/>
+          <a:p>
+            <a:pPr marL="0" marR="0" lvl="0" indent="0" algn="l" rtl="0">
+              <a:lnSpc>
+                <a:spcPct val="130000"/>
+              </a:lnSpc>
+              <a:spcBef>
+                <a:spcPts val="0"/>
+              </a:spcBef>
+              <a:spcAft>
+                <a:spcPts val="0"/>
+              </a:spcAft>
+              <a:buClr>
+                <a:schemeClr val="dk2"/>
+              </a:buClr>
+              <a:buSzPts val="1540"/>
+              <a:buFont typeface="Arial"/>
+              <a:buNone/>
+            </a:pPr>
+            <a:r>
+              <a:rPr lang="en-US" sz="1600" b="1" dirty="0"/>
+              <a:t> </a:t>
+            </a:r>
+          </a:p>
+          <a:p>
+            <a:pPr marL="0" marR="0" lvl="0" indent="0" algn="l" rtl="0">
+              <a:lnSpc>
+                <a:spcPct val="130000"/>
+              </a:lnSpc>
+              <a:spcBef>
+                <a:spcPts val="0"/>
+              </a:spcBef>
+              <a:spcAft>
+                <a:spcPts val="0"/>
+              </a:spcAft>
+              <a:buClr>
+                <a:schemeClr val="dk2"/>
+              </a:buClr>
+              <a:buSzPts val="1540"/>
+              <a:buFont typeface="Arial"/>
+              <a:buNone/>
+            </a:pPr>
+            <a:r>
+              <a:rPr lang="en-US" sz="1600" b="1" dirty="0"/>
+              <a:t>Git pull</a:t>
+            </a:r>
+            <a:endParaRPr lang="en-US" sz="1540" dirty="0">
+              <a:solidFill>
+                <a:schemeClr val="dk2"/>
+              </a:solidFill>
+              <a:latin typeface="Poppins Light"/>
+              <a:cs typeface="Poppins Light"/>
+              <a:sym typeface="Poppins Light"/>
+            </a:endParaRPr>
+          </a:p>
+        </p:txBody>
+      </p:sp>
+      <p:grpSp>
+        <p:nvGrpSpPr>
+          <p:cNvPr id="274" name="Google Shape;274;p25"/>
+          <p:cNvGrpSpPr/>
+          <p:nvPr/>
+        </p:nvGrpSpPr>
+        <p:grpSpPr>
+          <a:xfrm>
+            <a:off x="-8928" y="6325927"/>
+            <a:ext cx="12200929" cy="470414"/>
+            <a:chOff x="-8928" y="6325927"/>
+            <a:chExt cx="12200929" cy="470414"/>
+          </a:xfrm>
+        </p:grpSpPr>
+        <p:sp>
+          <p:nvSpPr>
+            <p:cNvPr id="275" name="Google Shape;275;p25"/>
+            <p:cNvSpPr/>
+            <p:nvPr/>
+          </p:nvSpPr>
+          <p:spPr>
+            <a:xfrm>
+              <a:off x="-8928" y="6576629"/>
+              <a:ext cx="10470284" cy="45719"/>
+            </a:xfrm>
+            <a:prstGeom prst="rect">
+              <a:avLst/>
+            </a:prstGeom>
+            <a:solidFill>
+              <a:srgbClr val="004586"/>
+            </a:solidFill>
+            <a:ln>
+              <a:noFill/>
+            </a:ln>
+          </p:spPr>
+          <p:txBody>
+            <a:bodyPr spcFirstLastPara="1" wrap="square" lIns="91425" tIns="45700" rIns="91425" bIns="45700" anchor="ctr" anchorCtr="0">
+              <a:noAutofit/>
+            </a:bodyPr>
+            <a:lstStyle/>
+            <a:p>
+              <a:pPr marL="0" marR="0" lvl="0" indent="0" algn="ctr" rtl="0">
+                <a:spcBef>
+                  <a:spcPts val="0"/>
+                </a:spcBef>
+                <a:spcAft>
+                  <a:spcPts val="0"/>
+                </a:spcAft>
+                <a:buNone/>
+              </a:pPr>
+              <a:endParaRPr sz="1800">
+                <a:solidFill>
+                  <a:schemeClr val="lt1"/>
+                </a:solidFill>
+                <a:latin typeface="Poppins Light"/>
+                <a:ea typeface="Poppins Light"/>
+                <a:cs typeface="Poppins Light"/>
+                <a:sym typeface="Poppins Light"/>
+              </a:endParaRPr>
+            </a:p>
+          </p:txBody>
+        </p:sp>
+        <p:pic>
+          <p:nvPicPr>
+            <p:cNvPr id="276" name="Google Shape;276;p25"/>
+            <p:cNvPicPr preferRelativeResize="0"/>
+            <p:nvPr/>
+          </p:nvPicPr>
+          <p:blipFill rotWithShape="1">
+            <a:blip r:embed="rId4">
+              <a:alphaModFix/>
+            </a:blip>
+            <a:srcRect/>
+            <a:stretch/>
+          </p:blipFill>
+          <p:spPr>
+            <a:xfrm>
+              <a:off x="10548364" y="6325927"/>
+              <a:ext cx="470414" cy="470414"/>
+            </a:xfrm>
+            <a:prstGeom prst="rect">
+              <a:avLst/>
+            </a:prstGeom>
+            <a:noFill/>
+            <a:ln>
+              <a:noFill/>
+            </a:ln>
+          </p:spPr>
+        </p:pic>
+        <p:sp>
+          <p:nvSpPr>
+            <p:cNvPr id="277" name="Google Shape;277;p25"/>
+            <p:cNvSpPr/>
+            <p:nvPr/>
+          </p:nvSpPr>
+          <p:spPr>
+            <a:xfrm rot="10800000" flipH="1">
+              <a:off x="11105786" y="6576628"/>
+              <a:ext cx="1086215" cy="45719"/>
+            </a:xfrm>
+            <a:prstGeom prst="rect">
+              <a:avLst/>
+            </a:prstGeom>
+            <a:solidFill>
+              <a:srgbClr val="004586"/>
+            </a:solidFill>
+            <a:ln>
+              <a:noFill/>
+            </a:ln>
+          </p:spPr>
+          <p:txBody>
+            <a:bodyPr spcFirstLastPara="1" wrap="square" lIns="91425" tIns="45700" rIns="91425" bIns="45700" anchor="ctr" anchorCtr="0">
+              <a:noAutofit/>
+            </a:bodyPr>
+            <a:lstStyle/>
+            <a:p>
+              <a:pPr marL="0" marR="0" lvl="0" indent="0" algn="ctr" rtl="0">
+                <a:spcBef>
+                  <a:spcPts val="0"/>
+                </a:spcBef>
+                <a:spcAft>
+                  <a:spcPts val="0"/>
+                </a:spcAft>
+                <a:buNone/>
+              </a:pPr>
+              <a:endParaRPr sz="1800">
+                <a:solidFill>
+                  <a:schemeClr val="lt1"/>
+                </a:solidFill>
+                <a:latin typeface="Poppins Light"/>
+                <a:ea typeface="Poppins Light"/>
+                <a:cs typeface="Poppins Light"/>
+                <a:sym typeface="Poppins Light"/>
+              </a:endParaRPr>
+            </a:p>
+          </p:txBody>
+        </p:sp>
+      </p:grpSp>
+      <p:pic>
+        <p:nvPicPr>
+          <p:cNvPr id="4" name="Picture 3">
+            <a:extLst>
+              <a:ext uri="{FF2B5EF4-FFF2-40B4-BE49-F238E27FC236}">
+                <a16:creationId xmlns:a16="http://schemas.microsoft.com/office/drawing/2014/main" id="{847F459E-A1D9-46F0-AF18-3245D350779C}"/>
+              </a:ext>
+            </a:extLst>
+          </p:cNvPr>
+          <p:cNvPicPr>
+            <a:picLocks noChangeAspect="1"/>
+          </p:cNvPicPr>
+          <p:nvPr/>
+        </p:nvPicPr>
+        <p:blipFill>
+          <a:blip r:embed="rId5"/>
+          <a:stretch>
+            <a:fillRect/>
+          </a:stretch>
+        </p:blipFill>
+        <p:spPr>
+          <a:xfrm>
+            <a:off x="1854927" y="1987531"/>
+            <a:ext cx="7846422" cy="3465124"/>
+          </a:xfrm>
+          <a:prstGeom prst="rect">
+            <a:avLst/>
+          </a:prstGeom>
+        </p:spPr>
+      </p:pic>
+    </p:spTree>
+    <p:extLst>
+      <p:ext uri="{BB962C8B-B14F-4D97-AF65-F5344CB8AC3E}">
+        <p14:creationId xmlns:p14="http://schemas.microsoft.com/office/powerpoint/2010/main" val="3813653386"/>
+      </p:ext>
+    </p:extLst>
+  </p:cSld>
+  <p:clrMapOvr>
+    <a:masterClrMapping/>
+  </p:clrMapOvr>
+  <p:transition spd="slow">
+    <p:push dir="r"/>
+  </p:transition>
+  <p:timing>
+    <p:tnLst>
+      <p:par>
+        <p:cTn id="1" dur="indefinite" restart="never" nodeType="tmRoot">
+          <p:childTnLst>
+            <p:seq concurrent="1" nextAc="seek">
+              <p:cTn id="2" dur="indefinite" nodeType="mainSeq">
+                <p:childTnLst>
+                  <p:par>
+                    <p:cTn id="3" fill="hold">
+                      <p:stCondLst>
+                        <p:cond delay="indefinite"/>
+                        <p:cond evt="onBegin" delay="0">
+                          <p:tn val="2"/>
+                        </p:cond>
+                      </p:stCondLst>
+                      <p:childTnLst>
+                        <p:par>
+                          <p:cTn id="4" fill="hold">
+                            <p:stCondLst>
+                              <p:cond delay="0"/>
+                            </p:stCondLst>
+                            <p:childTnLst>
+                              <p:par>
+                                <p:cTn id="5" presetID="10" presetClass="entr" presetSubtype="0" fill="hold" nodeType="withEffect">
+                                  <p:stCondLst>
+                                    <p:cond delay="0"/>
+                                  </p:stCondLst>
+                                  <p:childTnLst>
+                                    <p:set>
+                                      <p:cBhvr>
+                                        <p:cTn id="6" dur="1" fill="hold">
+                                          <p:stCondLst>
+                                            <p:cond delay="0"/>
+                                          </p:stCondLst>
+                                        </p:cTn>
+                                        <p:tgtEl>
+                                          <p:spTgt spid="271"/>
+                                        </p:tgtEl>
+                                        <p:attrNameLst>
+                                          <p:attrName>style.visibility</p:attrName>
+                                        </p:attrNameLst>
+                                      </p:cBhvr>
+                                      <p:to>
+                                        <p:strVal val="visible"/>
+                                      </p:to>
+                                    </p:set>
+                                    <p:animEffect transition="in" filter="fade">
+                                      <p:cBhvr>
+                                        <p:cTn id="7" dur="500"/>
+                                        <p:tgtEl>
+                                          <p:spTgt spid="271"/>
+                                        </p:tgtEl>
+                                      </p:cBhvr>
+                                    </p:animEffect>
+                                  </p:childTnLst>
+                                </p:cTn>
+                              </p:par>
+                            </p:childTnLst>
+                          </p:cTn>
+                        </p:par>
+                      </p:childTnLst>
+                    </p:cTn>
+                  </p:par>
+                </p:childTnLst>
+              </p:cTn>
+              <p:prevCondLst>
+                <p:cond evt="onPrev" delay="0">
+                  <p:tgtEl>
+                    <p:sldTgt/>
+                  </p:tgtEl>
+                </p:cond>
+              </p:prevCondLst>
+              <p:nextCondLst>
+                <p:cond evt="onNext" delay="0">
+                  <p:tgtEl>
+                    <p:sldTgt/>
+                  </p:tgtEl>
+                </p:cond>
+              </p:nextCondLst>
+            </p:seq>
+          </p:childTnLst>
+        </p:cTn>
+      </p:par>
+    </p:tnLst>
+  </p:timing>
+</p:sld>
+</file>
+
+<file path=ppt/slides/slide12.xml><?xml version="1.0" encoding="utf-8"?>
+<p:sld xmlns:a="http://schemas.openxmlformats.org/drawingml/2006/main" xmlns:r="http://schemas.openxmlformats.org/officeDocument/2006/relationships" xmlns:p="http://schemas.openxmlformats.org/presentationml/2006/main">
+  <p:cSld>
+    <p:spTree>
+      <p:nvGrpSpPr>
+        <p:cNvPr id="1" name="Shape 269"/>
+        <p:cNvGrpSpPr/>
+        <p:nvPr/>
+      </p:nvGrpSpPr>
+      <p:grpSpPr>
+        <a:xfrm>
+          <a:off x="0" y="0"/>
+          <a:ext cx="0" cy="0"/>
+          <a:chOff x="0" y="0"/>
+          <a:chExt cx="0" cy="0"/>
+        </a:xfrm>
+      </p:grpSpPr>
+      <p:sp>
+        <p:nvSpPr>
+          <p:cNvPr id="270" name="Google Shape;270;p25"/>
+          <p:cNvSpPr txBox="1"/>
+          <p:nvPr/>
+        </p:nvSpPr>
+        <p:spPr>
+          <a:xfrm>
             <a:off x="628650" y="2419349"/>
             <a:ext cx="10359647" cy="2285241"/>
           </a:xfrm>
@@ -5313,7 +6737,7 @@
                 <a:cs typeface="Poppins"/>
                 <a:sym typeface="Poppins"/>
               </a:rPr>
-              <a:t>Creation and committing to a new repository along with pushing files and pulling to and from a remote repository is successfully done with ease. To access the remote repository use : </a:t>
+              <a:t>Creation and committing to a new repository along with pushing files and pulling to and from a remote repository is successfully done. To access the remote repository use : </a:t>
             </a:r>
             <a:r>
               <a:rPr lang="en-US" dirty="0">
@@ -5788,7 +7212,7 @@
 </p:sld>
 </file>
 
-<file path=ppt/slides/slide11.xml><?xml version="1.0" encoding="utf-8"?>
+<file path=ppt/slides/slide13.xml><?xml version="1.0" encoding="utf-8"?>
 <p:sld xmlns:a="http://schemas.openxmlformats.org/drawingml/2006/main" xmlns:r="http://schemas.openxmlformats.org/officeDocument/2006/relationships" xmlns:p="http://schemas.openxmlformats.org/presentationml/2006/main">
   <p:cSld>
     <p:spTree>
@@ -6556,7 +7980,7 @@
               <a:buNone/>
             </a:pPr>
             <a:r>
-              <a:rPr lang="en-US" sz="4400" b="1" dirty="0">
+              <a:rPr lang="en-US" sz="4400" b="1" u="sng" dirty="0">
                 <a:solidFill>
                   <a:schemeClr val="dk1"/>
                 </a:solidFill>
@@ -6567,7 +7991,7 @@
               </a:rPr>
               <a:t>Contents</a:t>
             </a:r>
-            <a:endParaRPr sz="4400" b="1" dirty="0">
+            <a:endParaRPr sz="4400" b="1" u="sng" dirty="0">
               <a:solidFill>
                 <a:schemeClr val="dk1"/>
               </a:solidFill>
@@ -6948,7 +8372,7 @@
                 <a:effectLst/>
                 <a:latin typeface="+mn-lt"/>
               </a:rPr>
-              <a:t>Git thinks of its data more like a series of snapshots of a miniature filesystem. With Git, every time you commit, or save the state of your project, Git basically takes a picture of what all your files look like at that moment and stores a reference to that snapshot, </a:t>
+              <a:t>Git thinks of its data more like a series of snapshots of a miniature file system. With Git, every time you commit, or save the state of your project, Git basically takes a picture of what all your files look like at that moment and stores a reference to that snapshot, </a:t>
             </a:r>
             <a:r>
               <a:rPr lang="en-US" dirty="0">
@@ -7506,7 +8930,7 @@
                 <a:cs typeface="Poppins"/>
                 <a:sym typeface="Poppins"/>
               </a:rPr>
-              <a:t>Committing to the new file.</a:t>
+              <a:t>Committing to the new repository.</a:t>
             </a:r>
             <a:endParaRPr lang="en-US" sz="1600" b="1" dirty="0">
               <a:latin typeface="+mn-lt"/>
@@ -9748,7 +11172,7 @@
                 <a:cs typeface="Poppins"/>
                 <a:sym typeface="Poppins"/>
               </a:rPr>
-              <a:t>The command is : </a:t>
+              <a:t>The command is : git push –u origin master</a:t>
             </a:r>
             <a:endParaRPr dirty="0">
               <a:solidFill>
@@ -10227,7 +11651,7 @@
         </p:nvSpPr>
         <p:spPr>
           <a:xfrm>
-            <a:off x="659131" y="2207820"/>
+            <a:off x="746139" y="286723"/>
             <a:ext cx="10359647" cy="2285241"/>
           </a:xfrm>
           <a:prstGeom prst="rect">
@@ -10244,10 +11668,16 @@
           </a:bodyPr>
           <a:lstStyle/>
           <a:p>
-            <a:pPr marL="342900" indent="-342900" algn="just">
+            <a:pPr marL="342900" marR="0" lvl="0" indent="-342900" algn="just" rtl="0">
               <a:lnSpc>
                 <a:spcPct val="150000"/>
               </a:lnSpc>
+              <a:spcBef>
+                <a:spcPts val="0"/>
+              </a:spcBef>
+              <a:spcAft>
+                <a:spcPts val="0"/>
+              </a:spcAft>
               <a:buClr>
                 <a:schemeClr val="accent1"/>
               </a:buClr>
@@ -10255,135 +11685,11 @@
               <a:buFont typeface="Noto Sans Symbols"/>
               <a:buChar char="❑"/>
             </a:pPr>
-            <a:r>
-              <a:rPr lang="en-US" b="0" i="0" dirty="0">
-                <a:solidFill>
-                  <a:schemeClr val="tx1"/>
-                </a:solidFill>
-                <a:effectLst/>
-                <a:latin typeface="+mn-lt"/>
-              </a:rPr>
-              <a:t>The git pull command is used to fetch and download content from a remote repository and immediately update the local repository to match that content. Merging remote upstream changes into your local repository is a common task in Git-based collaboration work flows. </a:t>
-            </a:r>
-            <a:r>
-              <a:rPr lang="en-US" sz="1400" dirty="0">
-                <a:solidFill>
-                  <a:schemeClr val="tx1"/>
-                </a:solidFill>
-                <a:latin typeface="+mn-lt"/>
-                <a:ea typeface="Poppins"/>
-                <a:cs typeface="Poppins"/>
-                <a:sym typeface="Poppins"/>
-              </a:rPr>
-              <a:t>The git pull command is combination of two command git fetch followed by git merge.</a:t>
-            </a:r>
-          </a:p>
-          <a:p>
-            <a:pPr marL="342900" marR="0" lvl="0" indent="-228600" algn="just" rtl="0">
-              <a:lnSpc>
-                <a:spcPct val="150000"/>
-              </a:lnSpc>
-              <a:spcBef>
-                <a:spcPts val="0"/>
-              </a:spcBef>
-              <a:spcAft>
-                <a:spcPts val="0"/>
-              </a:spcAft>
-              <a:buClr>
-                <a:schemeClr val="accent1"/>
-              </a:buClr>
-              <a:buSzPts val="1800"/>
-              <a:buFont typeface="Noto Sans Symbols"/>
-              <a:buNone/>
-            </a:pPr>
-            <a:endParaRPr sz="1200" dirty="0">
-              <a:solidFill>
-                <a:schemeClr val="dk1"/>
-              </a:solidFill>
-              <a:latin typeface="Poppins"/>
-              <a:ea typeface="Poppins"/>
-              <a:cs typeface="Poppins"/>
-              <a:sym typeface="Poppins"/>
-            </a:endParaRPr>
-          </a:p>
-          <a:p>
-            <a:pPr marL="342900" marR="0" lvl="0" indent="-342900" algn="just" rtl="0">
-              <a:lnSpc>
-                <a:spcPct val="150000"/>
-              </a:lnSpc>
-              <a:spcBef>
-                <a:spcPts val="0"/>
-              </a:spcBef>
-              <a:spcAft>
-                <a:spcPts val="0"/>
-              </a:spcAft>
-              <a:buClr>
-                <a:schemeClr val="accent1"/>
-              </a:buClr>
-              <a:buSzPts val="1800"/>
-              <a:buFont typeface="Noto Sans Symbols"/>
-              <a:buChar char="❑"/>
-            </a:pPr>
-            <a:r>
-              <a:rPr lang="en-US" dirty="0">
-                <a:solidFill>
-                  <a:schemeClr val="dk1"/>
-                </a:solidFill>
-                <a:latin typeface="+mn-lt"/>
-                <a:ea typeface="Poppins"/>
-                <a:cs typeface="Poppins"/>
-                <a:sym typeface="Poppins"/>
-              </a:rPr>
-              <a:t>The git pull command is : </a:t>
-            </a:r>
-          </a:p>
-          <a:p>
-            <a:pPr marR="0" lvl="0" algn="just" rtl="0">
-              <a:lnSpc>
-                <a:spcPct val="150000"/>
-              </a:lnSpc>
-              <a:spcBef>
-                <a:spcPts val="0"/>
-              </a:spcBef>
-              <a:spcAft>
-                <a:spcPts val="0"/>
-              </a:spcAft>
-              <a:buClr>
-                <a:schemeClr val="accent1"/>
-              </a:buClr>
-              <a:buSzPts val="1800"/>
-            </a:pPr>
-            <a:endParaRPr lang="en-US" sz="1200" dirty="0">
-              <a:solidFill>
-                <a:schemeClr val="dk1"/>
-              </a:solidFill>
-              <a:latin typeface="Poppins"/>
-              <a:ea typeface="Poppins"/>
-              <a:cs typeface="Poppins"/>
-              <a:sym typeface="Poppins"/>
-            </a:endParaRPr>
-          </a:p>
-          <a:p>
-            <a:pPr marR="0" lvl="0" algn="just" rtl="0">
-              <a:lnSpc>
-                <a:spcPct val="150000"/>
-              </a:lnSpc>
-              <a:spcBef>
-                <a:spcPts val="0"/>
-              </a:spcBef>
-              <a:spcAft>
-                <a:spcPts val="0"/>
-              </a:spcAft>
-              <a:buClr>
-                <a:schemeClr val="accent1"/>
-              </a:buClr>
-              <a:buSzPts val="1800"/>
-            </a:pPr>
-            <a:endParaRPr sz="1200" b="1" dirty="0">
+            <a:endParaRPr sz="1600" b="1" dirty="0">
               <a:solidFill>
                 <a:srgbClr val="818181"/>
               </a:solidFill>
-              <a:latin typeface="Poppins"/>
+              <a:latin typeface="+mn-lt"/>
               <a:ea typeface="Poppins"/>
               <a:cs typeface="Poppins"/>
               <a:sym typeface="Poppins"/>
@@ -10426,7 +11732,7 @@
         </p:nvSpPr>
         <p:spPr>
           <a:xfrm>
-            <a:off x="628650" y="624794"/>
+            <a:off x="628650" y="358756"/>
             <a:ext cx="6315075" cy="914400"/>
           </a:xfrm>
           <a:prstGeom prst="rect">
@@ -10457,7 +11763,7 @@
                 <a:solidFill>
                   <a:schemeClr val="dk1"/>
                 </a:solidFill>
-                <a:latin typeface="Lato Black"/>
+                <a:latin typeface="+mj-lt"/>
                 <a:ea typeface="Lato Black"/>
                 <a:cs typeface="Lato Black"/>
                 <a:sym typeface="Lato Black"/>
@@ -10503,7 +11809,7 @@
         </p:nvSpPr>
         <p:spPr>
           <a:xfrm>
-            <a:off x="628650" y="1334687"/>
+            <a:off x="673894" y="815956"/>
             <a:ext cx="5029200" cy="714375"/>
           </a:xfrm>
           <a:prstGeom prst="rect">
@@ -10537,7 +11843,10 @@
               <a:buFont typeface="Arial"/>
               <a:buNone/>
             </a:pPr>
-            <a:endParaRPr lang="en-IN" dirty="0"/>
+            <a:r>
+              <a:rPr lang="en-US" sz="1600" b="1" dirty="0"/>
+              <a:t> </a:t>
+            </a:r>
           </a:p>
           <a:p>
             <a:pPr marL="0" marR="0" lvl="0" indent="0" algn="l" rtl="0">
@@ -10558,10 +11867,17 @@
               <a:buNone/>
             </a:pPr>
             <a:r>
-              <a:rPr lang="en-IN" b="1" dirty="0"/>
-              <a:t>What is git pull</a:t>
+              <a:rPr lang="en-US" sz="1600" b="1" dirty="0"/>
+              <a:t>Git push</a:t>
             </a:r>
-            <a:endParaRPr b="1" dirty="0"/>
+            <a:endParaRPr lang="en-US" sz="1540" dirty="0">
+              <a:solidFill>
+                <a:schemeClr val="dk2"/>
+              </a:solidFill>
+              <a:latin typeface="Poppins Light"/>
+              <a:cs typeface="Poppins Light"/>
+              <a:sym typeface="Poppins Light"/>
+            </a:endParaRPr>
           </a:p>
         </p:txBody>
       </p:sp>
@@ -10703,10 +12019,40 @@
           </p:txBody>
         </p:sp>
       </p:grpSp>
+      <p:pic>
+        <p:nvPicPr>
+          <p:cNvPr id="4" name="Picture 3">
+            <a:extLst>
+              <a:ext uri="{FF2B5EF4-FFF2-40B4-BE49-F238E27FC236}">
+                <a16:creationId xmlns:a16="http://schemas.microsoft.com/office/drawing/2014/main" id="{C12DD8B7-E0F7-4E43-BB95-0F2AE25D3C12}"/>
+              </a:ext>
+            </a:extLst>
+          </p:cNvPr>
+          <p:cNvPicPr>
+            <a:picLocks noChangeAspect="1"/>
+          </p:cNvPicPr>
+          <p:nvPr/>
+        </p:nvPicPr>
+        <p:blipFill>
+          <a:blip r:embed="rId5"/>
+          <a:stretch>
+            <a:fillRect/>
+          </a:stretch>
+        </p:blipFill>
+        <p:spPr>
+          <a:xfrm>
+            <a:off x="1811383" y="2057399"/>
+            <a:ext cx="7204029" cy="3384601"/>
+          </a:xfrm>
+          <a:prstGeom prst="rect">
+            <a:avLst/>
+          </a:prstGeom>
+        </p:spPr>
+      </p:pic>
     </p:spTree>
     <p:extLst>
       <p:ext uri="{BB962C8B-B14F-4D97-AF65-F5344CB8AC3E}">
-        <p14:creationId xmlns:p14="http://schemas.microsoft.com/office/powerpoint/2010/main" val="2899102661"/>
+        <p14:creationId xmlns:p14="http://schemas.microsoft.com/office/powerpoint/2010/main" val="3560197357"/>
       </p:ext>
     </p:extLst>
   </p:cSld>

</xml_diff>